<commit_message>
Tweak: mention algebraic spec earlier
</commit_message>
<xml_diff>
--- a/26-monads/lec.pptx
+++ b/26-monads/lec.pptx
@@ -246,7 +246,7 @@
           <a:p>
             <a:fld id="{5367F125-181F-9A48-A24E-AAD89CB055B5}" type="datetimeFigureOut">
               <a:rPr lang="en-US" smtClean="0"/>
-              <a:t>12/4/19</a:t>
+              <a:t>12/5/19</a:t>
             </a:fld>
             <a:endParaRPr lang="en-US"/>
           </a:p>
@@ -6999,7 +6999,7 @@
           <a:p>
             <a:fld id="{96331252-4874-F047-84B8-3D3EF8743E79}" type="datetimeFigureOut">
               <a:rPr lang="en-US" smtClean="0"/>
-              <a:t>12/4/19</a:t>
+              <a:t>12/5/19</a:t>
             </a:fld>
             <a:endParaRPr lang="en-US"/>
           </a:p>
@@ -7266,7 +7266,7 @@
           <a:p>
             <a:fld id="{96331252-4874-F047-84B8-3D3EF8743E79}" type="datetimeFigureOut">
               <a:rPr lang="en-US" smtClean="0"/>
-              <a:t>12/4/19</a:t>
+              <a:t>12/5/19</a:t>
             </a:fld>
             <a:endParaRPr lang="en-US"/>
           </a:p>
@@ -7444,7 +7444,7 @@
           <a:p>
             <a:fld id="{96331252-4874-F047-84B8-3D3EF8743E79}" type="datetimeFigureOut">
               <a:rPr lang="en-US" smtClean="0"/>
-              <a:t>12/4/19</a:t>
+              <a:t>12/5/19</a:t>
             </a:fld>
             <a:endParaRPr lang="en-US"/>
           </a:p>
@@ -7612,7 +7612,7 @@
           <a:p>
             <a:fld id="{96331252-4874-F047-84B8-3D3EF8743E79}" type="datetimeFigureOut">
               <a:rPr lang="en-US" smtClean="0"/>
-              <a:t>12/4/19</a:t>
+              <a:t>12/5/19</a:t>
             </a:fld>
             <a:endParaRPr lang="en-US"/>
           </a:p>
@@ -7857,7 +7857,7 @@
           <a:p>
             <a:fld id="{96331252-4874-F047-84B8-3D3EF8743E79}" type="datetimeFigureOut">
               <a:rPr lang="en-US" smtClean="0"/>
-              <a:t>12/4/19</a:t>
+              <a:t>12/5/19</a:t>
             </a:fld>
             <a:endParaRPr lang="en-US"/>
           </a:p>
@@ -8142,7 +8142,7 @@
           <a:p>
             <a:fld id="{96331252-4874-F047-84B8-3D3EF8743E79}" type="datetimeFigureOut">
               <a:rPr lang="en-US" smtClean="0"/>
-              <a:t>12/4/19</a:t>
+              <a:t>12/5/19</a:t>
             </a:fld>
             <a:endParaRPr lang="en-US"/>
           </a:p>
@@ -8561,7 +8561,7 @@
           <a:p>
             <a:fld id="{96331252-4874-F047-84B8-3D3EF8743E79}" type="datetimeFigureOut">
               <a:rPr lang="en-US" smtClean="0"/>
-              <a:t>12/4/19</a:t>
+              <a:t>12/5/19</a:t>
             </a:fld>
             <a:endParaRPr lang="en-US"/>
           </a:p>
@@ -8678,7 +8678,7 @@
           <a:p>
             <a:fld id="{96331252-4874-F047-84B8-3D3EF8743E79}" type="datetimeFigureOut">
               <a:rPr lang="en-US" smtClean="0"/>
-              <a:t>12/4/19</a:t>
+              <a:t>12/5/19</a:t>
             </a:fld>
             <a:endParaRPr lang="en-US"/>
           </a:p>
@@ -8773,7 +8773,7 @@
           <a:p>
             <a:fld id="{96331252-4874-F047-84B8-3D3EF8743E79}" type="datetimeFigureOut">
               <a:rPr lang="en-US" smtClean="0"/>
-              <a:t>12/4/19</a:t>
+              <a:t>12/5/19</a:t>
             </a:fld>
             <a:endParaRPr lang="en-US"/>
           </a:p>
@@ -9048,7 +9048,7 @@
           <a:p>
             <a:fld id="{96331252-4874-F047-84B8-3D3EF8743E79}" type="datetimeFigureOut">
               <a:rPr lang="en-US" smtClean="0"/>
-              <a:t>12/4/19</a:t>
+              <a:t>12/5/19</a:t>
             </a:fld>
             <a:endParaRPr lang="en-US"/>
           </a:p>
@@ -9300,7 +9300,7 @@
           <a:p>
             <a:fld id="{96331252-4874-F047-84B8-3D3EF8743E79}" type="datetimeFigureOut">
               <a:rPr lang="en-US" smtClean="0"/>
-              <a:t>12/4/19</a:t>
+              <a:t>12/5/19</a:t>
             </a:fld>
             <a:endParaRPr lang="en-US"/>
           </a:p>
@@ -9514,7 +9514,7 @@
             <a:fld id="{96331252-4874-F047-84B8-3D3EF8743E79}" type="datetimeFigureOut">
               <a:rPr lang="en-US" smtClean="0"/>
               <a:pPr/>
-              <a:t>12/4/19</a:t>
+              <a:t>12/5/19</a:t>
             </a:fld>
             <a:endParaRPr lang="en-US"/>
           </a:p>
@@ -23631,7 +23631,7 @@
           <a:p>
             <a:r>
               <a:rPr lang="en-US" dirty="0"/>
-              <a:t>Monad laws</a:t>
+              <a:t>Algebraic specification</a:t>
             </a:r>
           </a:p>
         </p:txBody>
@@ -25394,7 +25394,7 @@
         <p:spPr/>
         <p:txBody>
           <a:bodyPr>
-            <a:normAutofit lnSpcReduction="10000"/>
+            <a:normAutofit fontScale="92500" lnSpcReduction="10000"/>
           </a:bodyPr>
           <a:lstStyle/>
           <a:p>
@@ -25977,7 +25977,7 @@
                   <a:srgbClr val="6B0001"/>
                 </a:solidFill>
               </a:rPr>
-              <a:t> signature </a:t>
+              <a:t> signature* </a:t>
             </a:r>
             <a:r>
               <a:rPr lang="fr-FR" sz="2400" dirty="0" err="1">
@@ -26010,6 +26010,83 @@
                 </a:solidFill>
               </a:rPr>
               <a:t>.</a:t>
+            </a:r>
+          </a:p>
+          <a:p>
+            <a:pPr marL="0" indent="0">
+              <a:buNone/>
+            </a:pPr>
+            <a:r>
+              <a:rPr lang="fr-FR" sz="1900" dirty="0">
+                <a:solidFill>
+                  <a:srgbClr val="6B0001"/>
+                </a:solidFill>
+              </a:rPr>
+              <a:t>*And </a:t>
+            </a:r>
+            <a:r>
+              <a:rPr lang="fr-FR" sz="1900" dirty="0" err="1">
+                <a:solidFill>
+                  <a:srgbClr val="6B0001"/>
+                </a:solidFill>
+              </a:rPr>
+              <a:t>satisfies</a:t>
+            </a:r>
+            <a:r>
+              <a:rPr lang="fr-FR" sz="1900" dirty="0">
+                <a:solidFill>
+                  <a:srgbClr val="6B0001"/>
+                </a:solidFill>
+              </a:rPr>
+              <a:t> an </a:t>
+            </a:r>
+            <a:r>
+              <a:rPr lang="fr-FR" sz="1900" dirty="0" err="1">
+                <a:solidFill>
+                  <a:srgbClr val="6B0001"/>
+                </a:solidFill>
+              </a:rPr>
+              <a:t>algebraic</a:t>
+            </a:r>
+            <a:r>
+              <a:rPr lang="fr-FR" sz="1900" dirty="0">
+                <a:solidFill>
+                  <a:srgbClr val="6B0001"/>
+                </a:solidFill>
+              </a:rPr>
+              <a:t> </a:t>
+            </a:r>
+            <a:r>
+              <a:rPr lang="fr-FR" sz="1900" dirty="0" err="1">
+                <a:solidFill>
+                  <a:srgbClr val="6B0001"/>
+                </a:solidFill>
+              </a:rPr>
+              <a:t>specification</a:t>
+            </a:r>
+            <a:r>
+              <a:rPr lang="fr-FR" sz="1900" dirty="0">
+                <a:solidFill>
+                  <a:srgbClr val="6B0001"/>
+                </a:solidFill>
+              </a:rPr>
+              <a:t> </a:t>
+            </a:r>
+            <a:r>
+              <a:rPr lang="fr-FR" sz="1900" dirty="0" err="1">
+                <a:solidFill>
+                  <a:srgbClr val="6B0001"/>
+                </a:solidFill>
+              </a:rPr>
+              <a:t>we'll</a:t>
+            </a:r>
+            <a:r>
+              <a:rPr lang="fr-FR" sz="1900" dirty="0">
+                <a:solidFill>
+                  <a:srgbClr val="6B0001"/>
+                </a:solidFill>
+              </a:rPr>
+              <a:t> gave at the end</a:t>
             </a:r>
           </a:p>
           <a:p>
@@ -26113,7 +26190,7 @@
                                         <p:tgtEl>
                                           <p:spTgt spid="3">
                                             <p:txEl>
-                                              <p:pRg st="10" end="10"/>
+                                              <p:pRg st="11" end="11"/>
                                             </p:txEl>
                                           </p:spTgt>
                                         </p:tgtEl>

</xml_diff>